<commit_message>
Added my predictions to Summary slide
</commit_message>
<xml_diff>
--- a/BAMF Presentation_RobsNewAnalysisSlides.pptx
+++ b/BAMF Presentation_RobsNewAnalysisSlides.pptx
@@ -5,12 +5,14 @@
     <p:sldMasterId id="2147483648" r:id="rId1"/>
   </p:sldMasterIdLst>
   <p:notesMasterIdLst>
-    <p:notesMasterId r:id="rId5"/>
+    <p:notesMasterId r:id="rId7"/>
   </p:notesMasterIdLst>
   <p:sldIdLst>
     <p:sldId id="278" r:id="rId2"/>
     <p:sldId id="287" r:id="rId3"/>
     <p:sldId id="286" r:id="rId4"/>
+    <p:sldId id="288" r:id="rId5"/>
+    <p:sldId id="289" r:id="rId6"/>
   </p:sldIdLst>
   <p:sldSz cx="12192000" cy="6858000"/>
   <p:notesSz cx="6858000" cy="9144000"/>
@@ -7383,6 +7385,1209 @@
     <p:extLst>
       <p:ext uri="{BB962C8B-B14F-4D97-AF65-F5344CB8AC3E}">
         <p14:creationId xmlns:p14="http://schemas.microsoft.com/office/powerpoint/2010/main" val="2241876771"/>
+      </p:ext>
+    </p:extLst>
+  </p:cSld>
+  <p:clrMapOvr>
+    <a:masterClrMapping/>
+  </p:clrMapOvr>
+</p:sld>
+</file>
+
+<file path=ppt/slides/slide4.xml><?xml version="1.0" encoding="utf-8"?>
+<p:sld xmlns:a="http://schemas.openxmlformats.org/drawingml/2006/main" xmlns:r="http://schemas.openxmlformats.org/officeDocument/2006/relationships" xmlns:p="http://schemas.openxmlformats.org/presentationml/2006/main">
+  <p:cSld>
+    <p:bg>
+      <p:bgPr>
+        <a:solidFill>
+          <a:schemeClr val="bg2"/>
+        </a:solidFill>
+        <a:effectLst/>
+      </p:bgPr>
+    </p:bg>
+    <p:spTree>
+      <p:nvGrpSpPr>
+        <p:cNvPr id="1" name=""/>
+        <p:cNvGrpSpPr/>
+        <p:nvPr/>
+      </p:nvGrpSpPr>
+      <p:grpSpPr>
+        <a:xfrm>
+          <a:off x="0" y="0"/>
+          <a:ext cx="0" cy="0"/>
+          <a:chOff x="0" y="0"/>
+          <a:chExt cx="0" cy="0"/>
+        </a:xfrm>
+      </p:grpSpPr>
+      <p:sp useBgFill="1">
+        <p:nvSpPr>
+          <p:cNvPr id="9" name="Rectangle 8">
+            <a:extLst>
+              <a:ext uri="{FF2B5EF4-FFF2-40B4-BE49-F238E27FC236}">
+                <a16:creationId xmlns:a16="http://schemas.microsoft.com/office/drawing/2014/main" id="{4281BC32-FF58-4898-A6B5-7B3D059BCEB0}"/>
+              </a:ext>
+              <a:ext uri="{C183D7F6-B498-43B3-948B-1728B52AA6E4}">
+                <adec:decorative xmlns:adec="http://schemas.microsoft.com/office/drawing/2017/decorative" val="1"/>
+              </a:ext>
+            </a:extLst>
+          </p:cNvPr>
+          <p:cNvSpPr>
+            <a:spLocks noGrp="1" noRot="1" noChangeAspect="1" noMove="1" noResize="1" noEditPoints="1" noAdjustHandles="1" noChangeArrowheads="1" noChangeShapeType="1" noTextEdit="1"/>
+          </p:cNvSpPr>
+          <p:nvPr>
+            <p:extLst>
+              <p:ext uri="{386F3935-93C4-4BCD-93E2-E3B085C9AB24}">
+                <p16:designElem xmlns:p16="http://schemas.microsoft.com/office/powerpoint/2015/main" val="1"/>
+              </p:ext>
+            </p:extLst>
+          </p:nvPr>
+        </p:nvSpPr>
+        <p:spPr>
+          <a:xfrm>
+            <a:off x="0" y="0"/>
+            <a:ext cx="12192000" cy="6858000"/>
+          </a:xfrm>
+          <a:prstGeom prst="rect">
+            <a:avLst/>
+          </a:prstGeom>
+          <a:ln>
+            <a:noFill/>
+          </a:ln>
+        </p:spPr>
+        <p:style>
+          <a:lnRef idx="2">
+            <a:schemeClr val="accent1">
+              <a:shade val="50000"/>
+            </a:schemeClr>
+          </a:lnRef>
+          <a:fillRef idx="1">
+            <a:schemeClr val="accent1"/>
+          </a:fillRef>
+          <a:effectRef idx="0">
+            <a:schemeClr val="accent1"/>
+          </a:effectRef>
+          <a:fontRef idx="minor">
+            <a:schemeClr val="lt1"/>
+          </a:fontRef>
+        </p:style>
+        <p:txBody>
+          <a:bodyPr rtlCol="0" anchor="ctr"/>
+          <a:lstStyle/>
+          <a:p>
+            <a:pPr marL="0" marR="0" lvl="0" indent="0" algn="ctr" defTabSz="457200" rtl="0" eaLnBrk="1" fontAlgn="auto" latinLnBrk="0" hangingPunct="1">
+              <a:lnSpc>
+                <a:spcPct val="100000"/>
+              </a:lnSpc>
+              <a:spcBef>
+                <a:spcPts val="0"/>
+              </a:spcBef>
+              <a:spcAft>
+                <a:spcPts val="0"/>
+              </a:spcAft>
+              <a:buClrTx/>
+              <a:buSzTx/>
+              <a:buFontTx/>
+              <a:buNone/>
+              <a:tabLst/>
+              <a:defRPr/>
+            </a:pPr>
+            <a:endParaRPr kumimoji="0" lang="en-US" sz="1800" b="0" i="0" u="none" strike="noStrike" kern="1200" cap="none" spc="0" normalizeH="0" baseline="0" noProof="0">
+              <a:ln>
+                <a:noFill/>
+              </a:ln>
+              <a:solidFill>
+                <a:prstClr val="white"/>
+              </a:solidFill>
+              <a:effectLst/>
+              <a:uLnTx/>
+              <a:uFillTx/>
+              <a:latin typeface="Corbel" panose="020B0503020204020204"/>
+              <a:ea typeface="+mn-ea"/>
+              <a:cs typeface="+mn-cs"/>
+            </a:endParaRPr>
+          </a:p>
+        </p:txBody>
+      </p:sp>
+      <p:sp>
+        <p:nvSpPr>
+          <p:cNvPr id="11" name="Rectangle 10">
+            <a:extLst>
+              <a:ext uri="{FF2B5EF4-FFF2-40B4-BE49-F238E27FC236}">
+                <a16:creationId xmlns:a16="http://schemas.microsoft.com/office/drawing/2014/main" id="{0D614406-135F-4875-9C87-53822CB19ABB}"/>
+              </a:ext>
+              <a:ext uri="{C183D7F6-B498-43B3-948B-1728B52AA6E4}">
+                <adec:decorative xmlns:adec="http://schemas.microsoft.com/office/drawing/2017/decorative" val="1"/>
+              </a:ext>
+            </a:extLst>
+          </p:cNvPr>
+          <p:cNvSpPr>
+            <a:spLocks noGrp="1" noRot="1" noChangeAspect="1" noMove="1" noResize="1" noEditPoints="1" noAdjustHandles="1" noChangeArrowheads="1" noChangeShapeType="1" noTextEdit="1"/>
+          </p:cNvSpPr>
+          <p:nvPr>
+            <p:extLst>
+              <p:ext uri="{386F3935-93C4-4BCD-93E2-E3B085C9AB24}">
+                <p16:designElem xmlns:p16="http://schemas.microsoft.com/office/powerpoint/2015/main" val="1"/>
+              </p:ext>
+            </p:extLst>
+          </p:nvPr>
+        </p:nvSpPr>
+        <p:spPr>
+          <a:xfrm>
+            <a:off x="0" y="0"/>
+            <a:ext cx="12191999" cy="2285999"/>
+          </a:xfrm>
+          <a:prstGeom prst="rect">
+            <a:avLst/>
+          </a:prstGeom>
+          <a:solidFill>
+            <a:schemeClr val="tx1"/>
+          </a:solidFill>
+          <a:ln>
+            <a:noFill/>
+          </a:ln>
+        </p:spPr>
+        <p:style>
+          <a:lnRef idx="2">
+            <a:schemeClr val="accent1">
+              <a:shade val="50000"/>
+            </a:schemeClr>
+          </a:lnRef>
+          <a:fillRef idx="1">
+            <a:schemeClr val="accent1"/>
+          </a:fillRef>
+          <a:effectRef idx="0">
+            <a:schemeClr val="accent1"/>
+          </a:effectRef>
+          <a:fontRef idx="minor">
+            <a:schemeClr val="lt1"/>
+          </a:fontRef>
+        </p:style>
+        <p:txBody>
+          <a:bodyPr rtlCol="0" anchor="ctr"/>
+          <a:lstStyle/>
+          <a:p>
+            <a:pPr marL="0" marR="0" lvl="0" indent="0" algn="ctr" defTabSz="457200" rtl="0" eaLnBrk="1" fontAlgn="auto" latinLnBrk="0" hangingPunct="1">
+              <a:lnSpc>
+                <a:spcPct val="100000"/>
+              </a:lnSpc>
+              <a:spcBef>
+                <a:spcPts val="0"/>
+              </a:spcBef>
+              <a:spcAft>
+                <a:spcPts val="0"/>
+              </a:spcAft>
+              <a:buClrTx/>
+              <a:buSzTx/>
+              <a:buFontTx/>
+              <a:buNone/>
+              <a:tabLst/>
+              <a:defRPr/>
+            </a:pPr>
+            <a:endParaRPr kumimoji="0" lang="en-US" sz="1800" b="0" i="0" u="none" strike="noStrike" kern="1200" cap="none" spc="0" normalizeH="0" baseline="0" noProof="0">
+              <a:ln>
+                <a:noFill/>
+              </a:ln>
+              <a:solidFill>
+                <a:prstClr val="white"/>
+              </a:solidFill>
+              <a:effectLst/>
+              <a:uLnTx/>
+              <a:uFillTx/>
+              <a:latin typeface="Corbel" panose="020B0503020204020204"/>
+              <a:ea typeface="+mn-ea"/>
+              <a:cs typeface="+mn-cs"/>
+            </a:endParaRPr>
+          </a:p>
+        </p:txBody>
+      </p:sp>
+      <p:sp>
+        <p:nvSpPr>
+          <p:cNvPr id="2" name="Title 1"/>
+          <p:cNvSpPr>
+            <a:spLocks noGrp="1"/>
+          </p:cNvSpPr>
+          <p:nvPr>
+            <p:ph type="title"/>
+          </p:nvPr>
+        </p:nvSpPr>
+        <p:spPr>
+          <a:xfrm>
+            <a:off x="155421" y="115360"/>
+            <a:ext cx="7169753" cy="1232750"/>
+          </a:xfrm>
+        </p:spPr>
+        <p:txBody>
+          <a:bodyPr anchor="b">
+            <a:normAutofit/>
+          </a:bodyPr>
+          <a:lstStyle/>
+          <a:p>
+            <a:pPr algn="l"/>
+            <a:r>
+              <a:rPr lang="en-US" dirty="0">
+                <a:solidFill>
+                  <a:schemeClr val="bg1"/>
+                </a:solidFill>
+              </a:rPr>
+              <a:t>Summary</a:t>
+            </a:r>
+          </a:p>
+        </p:txBody>
+      </p:sp>
+      <p:cxnSp>
+        <p:nvCxnSpPr>
+          <p:cNvPr id="13" name="Straight Connector 12">
+            <a:extLst>
+              <a:ext uri="{FF2B5EF4-FFF2-40B4-BE49-F238E27FC236}">
+                <a16:creationId xmlns:a16="http://schemas.microsoft.com/office/drawing/2014/main" id="{C6C21149-7D17-44C2-AFB6-4D931DC55FB1}"/>
+              </a:ext>
+              <a:ext uri="{C183D7F6-B498-43B3-948B-1728B52AA6E4}">
+                <adec:decorative xmlns:adec="http://schemas.microsoft.com/office/drawing/2017/decorative" val="1"/>
+              </a:ext>
+            </a:extLst>
+          </p:cNvPr>
+          <p:cNvCxnSpPr>
+            <a:cxnSpLocks noGrp="1" noRot="1" noChangeAspect="1" noMove="1" noResize="1" noEditPoints="1" noAdjustHandles="1" noChangeArrowheads="1" noChangeShapeType="1"/>
+          </p:cNvCxnSpPr>
+          <p:nvPr>
+            <p:extLst>
+              <p:ext uri="{386F3935-93C4-4BCD-93E2-E3B085C9AB24}">
+                <p16:designElem xmlns:p16="http://schemas.microsoft.com/office/powerpoint/2015/main" val="1"/>
+              </p:ext>
+            </p:extLst>
+          </p:nvPr>
+        </p:nvCxnSpPr>
+        <p:spPr>
+          <a:xfrm>
+            <a:off x="0" y="1676579"/>
+            <a:ext cx="8129873" cy="6020"/>
+          </a:xfrm>
+          <a:prstGeom prst="line">
+            <a:avLst/>
+          </a:prstGeom>
+          <a:ln w="25400">
+            <a:solidFill>
+              <a:schemeClr val="bg1"/>
+            </a:solidFill>
+          </a:ln>
+        </p:spPr>
+        <p:style>
+          <a:lnRef idx="1">
+            <a:schemeClr val="accent1"/>
+          </a:lnRef>
+          <a:fillRef idx="0">
+            <a:schemeClr val="accent1"/>
+          </a:fillRef>
+          <a:effectRef idx="0">
+            <a:schemeClr val="accent1"/>
+          </a:effectRef>
+          <a:fontRef idx="minor">
+            <a:schemeClr val="tx1"/>
+          </a:fontRef>
+        </p:style>
+      </p:cxnSp>
+      <p:sp>
+        <p:nvSpPr>
+          <p:cNvPr id="15" name="Freeform 6">
+            <a:extLst>
+              <a:ext uri="{FF2B5EF4-FFF2-40B4-BE49-F238E27FC236}">
+                <a16:creationId xmlns:a16="http://schemas.microsoft.com/office/drawing/2014/main" id="{C2E5FCF0-567A-448C-A6E3-920BFC702C2F}"/>
+              </a:ext>
+              <a:ext uri="{C183D7F6-B498-43B3-948B-1728B52AA6E4}">
+                <adec:decorative xmlns:adec="http://schemas.microsoft.com/office/drawing/2017/decorative" val="1"/>
+              </a:ext>
+            </a:extLst>
+          </p:cNvPr>
+          <p:cNvSpPr>
+            <a:spLocks noGrp="1" noRot="1" noChangeAspect="1" noMove="1" noResize="1" noEditPoints="1" noAdjustHandles="1" noChangeArrowheads="1" noChangeShapeType="1" noTextEdit="1"/>
+          </p:cNvSpPr>
+          <p:nvPr>
+            <p:extLst>
+              <p:ext uri="{386F3935-93C4-4BCD-93E2-E3B085C9AB24}">
+                <p16:designElem xmlns:p16="http://schemas.microsoft.com/office/powerpoint/2015/main" val="1"/>
+              </p:ext>
+            </p:extLst>
+          </p:nvPr>
+        </p:nvSpPr>
+        <p:spPr bwMode="auto">
+          <a:xfrm>
+            <a:off x="11784011" y="938535"/>
+            <a:ext cx="407988" cy="819150"/>
+          </a:xfrm>
+          <a:custGeom>
+            <a:avLst/>
+            <a:gdLst/>
+            <a:ahLst/>
+            <a:cxnLst/>
+            <a:rect l="0" t="0" r="r" b="b"/>
+            <a:pathLst>
+              <a:path w="1799" h="3612">
+                <a:moveTo>
+                  <a:pt x="1799" y="0"/>
+                </a:moveTo>
+                <a:lnTo>
+                  <a:pt x="1799" y="3612"/>
+                </a:lnTo>
+                <a:lnTo>
+                  <a:pt x="1686" y="3609"/>
+                </a:lnTo>
+                <a:lnTo>
+                  <a:pt x="1574" y="3598"/>
+                </a:lnTo>
+                <a:lnTo>
+                  <a:pt x="1464" y="3581"/>
+                </a:lnTo>
+                <a:lnTo>
+                  <a:pt x="1357" y="3557"/>
+                </a:lnTo>
+                <a:lnTo>
+                  <a:pt x="1251" y="3527"/>
+                </a:lnTo>
+                <a:lnTo>
+                  <a:pt x="1150" y="3490"/>
+                </a:lnTo>
+                <a:lnTo>
+                  <a:pt x="1050" y="3448"/>
+                </a:lnTo>
+                <a:lnTo>
+                  <a:pt x="953" y="3401"/>
+                </a:lnTo>
+                <a:lnTo>
+                  <a:pt x="860" y="3347"/>
+                </a:lnTo>
+                <a:lnTo>
+                  <a:pt x="771" y="3289"/>
+                </a:lnTo>
+                <a:lnTo>
+                  <a:pt x="686" y="3224"/>
+                </a:lnTo>
+                <a:lnTo>
+                  <a:pt x="604" y="3156"/>
+                </a:lnTo>
+                <a:lnTo>
+                  <a:pt x="527" y="3083"/>
+                </a:lnTo>
+                <a:lnTo>
+                  <a:pt x="454" y="3005"/>
+                </a:lnTo>
+                <a:lnTo>
+                  <a:pt x="386" y="2923"/>
+                </a:lnTo>
+                <a:lnTo>
+                  <a:pt x="323" y="2838"/>
+                </a:lnTo>
+                <a:lnTo>
+                  <a:pt x="265" y="2748"/>
+                </a:lnTo>
+                <a:lnTo>
+                  <a:pt x="211" y="2655"/>
+                </a:lnTo>
+                <a:lnTo>
+                  <a:pt x="163" y="2559"/>
+                </a:lnTo>
+                <a:lnTo>
+                  <a:pt x="121" y="2459"/>
+                </a:lnTo>
+                <a:lnTo>
+                  <a:pt x="85" y="2356"/>
+                </a:lnTo>
+                <a:lnTo>
+                  <a:pt x="55" y="2251"/>
+                </a:lnTo>
+                <a:lnTo>
+                  <a:pt x="32" y="2143"/>
+                </a:lnTo>
+                <a:lnTo>
+                  <a:pt x="14" y="2033"/>
+                </a:lnTo>
+                <a:lnTo>
+                  <a:pt x="4" y="1920"/>
+                </a:lnTo>
+                <a:lnTo>
+                  <a:pt x="0" y="1806"/>
+                </a:lnTo>
+                <a:lnTo>
+                  <a:pt x="4" y="1692"/>
+                </a:lnTo>
+                <a:lnTo>
+                  <a:pt x="14" y="1580"/>
+                </a:lnTo>
+                <a:lnTo>
+                  <a:pt x="32" y="1469"/>
+                </a:lnTo>
+                <a:lnTo>
+                  <a:pt x="55" y="1362"/>
+                </a:lnTo>
+                <a:lnTo>
+                  <a:pt x="85" y="1256"/>
+                </a:lnTo>
+                <a:lnTo>
+                  <a:pt x="121" y="1154"/>
+                </a:lnTo>
+                <a:lnTo>
+                  <a:pt x="163" y="1054"/>
+                </a:lnTo>
+                <a:lnTo>
+                  <a:pt x="211" y="958"/>
+                </a:lnTo>
+                <a:lnTo>
+                  <a:pt x="265" y="864"/>
+                </a:lnTo>
+                <a:lnTo>
+                  <a:pt x="323" y="774"/>
+                </a:lnTo>
+                <a:lnTo>
+                  <a:pt x="386" y="689"/>
+                </a:lnTo>
+                <a:lnTo>
+                  <a:pt x="454" y="607"/>
+                </a:lnTo>
+                <a:lnTo>
+                  <a:pt x="527" y="529"/>
+                </a:lnTo>
+                <a:lnTo>
+                  <a:pt x="604" y="456"/>
+                </a:lnTo>
+                <a:lnTo>
+                  <a:pt x="686" y="388"/>
+                </a:lnTo>
+                <a:lnTo>
+                  <a:pt x="771" y="325"/>
+                </a:lnTo>
+                <a:lnTo>
+                  <a:pt x="860" y="266"/>
+                </a:lnTo>
+                <a:lnTo>
+                  <a:pt x="953" y="212"/>
+                </a:lnTo>
+                <a:lnTo>
+                  <a:pt x="1050" y="164"/>
+                </a:lnTo>
+                <a:lnTo>
+                  <a:pt x="1150" y="122"/>
+                </a:lnTo>
+                <a:lnTo>
+                  <a:pt x="1251" y="85"/>
+                </a:lnTo>
+                <a:lnTo>
+                  <a:pt x="1357" y="55"/>
+                </a:lnTo>
+                <a:lnTo>
+                  <a:pt x="1464" y="32"/>
+                </a:lnTo>
+                <a:lnTo>
+                  <a:pt x="1574" y="14"/>
+                </a:lnTo>
+                <a:lnTo>
+                  <a:pt x="1686" y="5"/>
+                </a:lnTo>
+                <a:lnTo>
+                  <a:pt x="1799" y="0"/>
+                </a:lnTo>
+                <a:close/>
+              </a:path>
+            </a:pathLst>
+          </a:custGeom>
+          <a:solidFill>
+            <a:schemeClr val="bg2"/>
+          </a:solidFill>
+          <a:ln w="0">
+            <a:noFill/>
+            <a:prstDash val="solid"/>
+            <a:round/>
+            <a:headEnd/>
+            <a:tailEnd/>
+          </a:ln>
+        </p:spPr>
+      </p:sp>
+      <p:sp>
+        <p:nvSpPr>
+          <p:cNvPr id="3" name="Content Placeholder 2"/>
+          <p:cNvSpPr>
+            <a:spLocks noGrp="1"/>
+          </p:cNvSpPr>
+          <p:nvPr>
+            <p:ph idx="1"/>
+          </p:nvPr>
+        </p:nvSpPr>
+        <p:spPr>
+          <a:xfrm>
+            <a:off x="381001" y="2421964"/>
+            <a:ext cx="11403010" cy="4182321"/>
+          </a:xfrm>
+        </p:spPr>
+        <p:txBody>
+          <a:bodyPr>
+            <a:noAutofit/>
+          </a:bodyPr>
+          <a:lstStyle/>
+          <a:p>
+            <a:r>
+              <a:rPr lang="en-US" sz="1600" dirty="0">
+                <a:solidFill>
+                  <a:schemeClr val="tx1"/>
+                </a:solidFill>
+              </a:rPr>
+              <a:t>Watch Out!     Data Analysts Beware!        –    Some API vendors charge by transaction (10 cents per flight)</a:t>
+            </a:r>
+          </a:p>
+          <a:p>
+            <a:r>
+              <a:rPr lang="en-US" sz="1600" dirty="0">
+                <a:solidFill>
+                  <a:schemeClr val="tx1"/>
+                </a:solidFill>
+              </a:rPr>
+              <a:t>Government shutdown effects on airports and airlines is gradual. There was no significant disruption to the number of flights or passengers, and delay durations in the first week of shutdown was comparable to the non government shutdown period. </a:t>
+            </a:r>
+          </a:p>
+          <a:p>
+            <a:r>
+              <a:rPr lang="en-US" sz="1600" dirty="0">
+                <a:solidFill>
+                  <a:schemeClr val="tx1"/>
+                </a:solidFill>
+              </a:rPr>
+              <a:t>Delta Airlines appears to be able to operationally optimize aircraft at the Major Hub of Atlanta to reduce departures delay times. They are less dependent on specific aircraft making timely connections. But this does not imply that all passengers are always able to make their connections through Atlanta Airport. </a:t>
+            </a:r>
+          </a:p>
+          <a:p>
+            <a:r>
+              <a:rPr lang="en-US" sz="1600" dirty="0">
+                <a:solidFill>
+                  <a:schemeClr val="tx1"/>
+                </a:solidFill>
+              </a:rPr>
+              <a:t>Delayed flights bound for Atlanta from Orlando experience significantly larger delays compared with connections in Atlanta. This might be due to lower availability of air traffic controllers at MCO compared with ATL. It may also be due to the volume of passengers originating in Orlando, unable to board timely, due to extensive security checkpoint delays.</a:t>
+            </a:r>
+          </a:p>
+          <a:p>
+            <a:r>
+              <a:rPr lang="en-US" sz="1600" dirty="0">
+                <a:solidFill>
+                  <a:schemeClr val="tx1"/>
+                </a:solidFill>
+              </a:rPr>
+              <a:t>If the government elects to privatize air traffic controllers and airport security and customs officers, this might possibly alleviate some of the airport based flight delays. But there is insufficient data available to directly correlate all of these factors.</a:t>
+            </a:r>
+          </a:p>
+          <a:p>
+            <a:r>
+              <a:rPr lang="en-US" sz="1600" dirty="0">
+                <a:solidFill>
+                  <a:schemeClr val="tx1"/>
+                </a:solidFill>
+              </a:rPr>
+              <a:t>If I do need to travel during a government shutdown in the future, I would plan to book a morning flight from Orlando, with enough time to make an afternoon connection in Atlanta. I would be less concerned with my connection being delayed in Atlanta.     </a:t>
+            </a:r>
+            <a:endParaRPr sz="1600" dirty="0">
+              <a:solidFill>
+                <a:schemeClr val="tx1"/>
+              </a:solidFill>
+            </a:endParaRPr>
+          </a:p>
+        </p:txBody>
+      </p:sp>
+      <p:pic>
+        <p:nvPicPr>
+          <p:cNvPr id="1026" name="Picture 2" descr="Image result for Delta boarding pass MCO">
+            <a:extLst>
+              <a:ext uri="{FF2B5EF4-FFF2-40B4-BE49-F238E27FC236}">
+                <a16:creationId xmlns:a16="http://schemas.microsoft.com/office/drawing/2014/main" id="{FB418979-F7BA-442D-9791-37C7A9A2652B}"/>
+              </a:ext>
+            </a:extLst>
+          </p:cNvPr>
+          <p:cNvPicPr>
+            <a:picLocks noChangeAspect="1" noChangeArrowheads="1"/>
+          </p:cNvPicPr>
+          <p:nvPr/>
+        </p:nvPicPr>
+        <p:blipFill>
+          <a:blip r:embed="rId2">
+            <a:extLst>
+              <a:ext uri="{28A0092B-C50C-407E-A947-70E740481C1C}">
+                <a14:useLocalDpi xmlns:a14="http://schemas.microsoft.com/office/drawing/2010/main" val="0"/>
+              </a:ext>
+            </a:extLst>
+          </a:blip>
+          <a:srcRect/>
+          <a:stretch>
+            <a:fillRect/>
+          </a:stretch>
+        </p:blipFill>
+        <p:spPr bwMode="auto">
+          <a:xfrm rot="20406036">
+            <a:off x="8607841" y="430614"/>
+            <a:ext cx="2766591" cy="1402778"/>
+          </a:xfrm>
+          <a:prstGeom prst="rect">
+            <a:avLst/>
+          </a:prstGeom>
+          <a:noFill/>
+          <a:extLst>
+            <a:ext uri="{909E8E84-426E-40DD-AFC4-6F175D3DCCD1}">
+              <a14:hiddenFill xmlns:a14="http://schemas.microsoft.com/office/drawing/2010/main">
+                <a:solidFill>
+                  <a:srgbClr val="FFFFFF"/>
+                </a:solidFill>
+              </a14:hiddenFill>
+            </a:ext>
+          </a:extLst>
+        </p:spPr>
+      </p:pic>
+    </p:spTree>
+    <p:extLst>
+      <p:ext uri="{BB962C8B-B14F-4D97-AF65-F5344CB8AC3E}">
+        <p14:creationId xmlns:p14="http://schemas.microsoft.com/office/powerpoint/2010/main" val="417932294"/>
+      </p:ext>
+    </p:extLst>
+  </p:cSld>
+  <p:clrMapOvr>
+    <a:masterClrMapping/>
+  </p:clrMapOvr>
+</p:sld>
+</file>
+
+<file path=ppt/slides/slide5.xml><?xml version="1.0" encoding="utf-8"?>
+<p:sld xmlns:a="http://schemas.openxmlformats.org/drawingml/2006/main" xmlns:r="http://schemas.openxmlformats.org/officeDocument/2006/relationships" xmlns:p="http://schemas.openxmlformats.org/presentationml/2006/main">
+  <p:cSld>
+    <p:bg>
+      <p:bgPr>
+        <a:solidFill>
+          <a:schemeClr val="bg2"/>
+        </a:solidFill>
+        <a:effectLst/>
+      </p:bgPr>
+    </p:bg>
+    <p:spTree>
+      <p:nvGrpSpPr>
+        <p:cNvPr id="1" name=""/>
+        <p:cNvGrpSpPr/>
+        <p:nvPr/>
+      </p:nvGrpSpPr>
+      <p:grpSpPr>
+        <a:xfrm>
+          <a:off x="0" y="0"/>
+          <a:ext cx="0" cy="0"/>
+          <a:chOff x="0" y="0"/>
+          <a:chExt cx="0" cy="0"/>
+        </a:xfrm>
+      </p:grpSpPr>
+      <p:sp useBgFill="1">
+        <p:nvSpPr>
+          <p:cNvPr id="9" name="Rectangle 8">
+            <a:extLst>
+              <a:ext uri="{FF2B5EF4-FFF2-40B4-BE49-F238E27FC236}">
+                <a16:creationId xmlns:a16="http://schemas.microsoft.com/office/drawing/2014/main" id="{4281BC32-FF58-4898-A6B5-7B3D059BCEB0}"/>
+              </a:ext>
+              <a:ext uri="{C183D7F6-B498-43B3-948B-1728B52AA6E4}">
+                <adec:decorative xmlns:adec="http://schemas.microsoft.com/office/drawing/2017/decorative" val="1"/>
+              </a:ext>
+            </a:extLst>
+          </p:cNvPr>
+          <p:cNvSpPr>
+            <a:spLocks noGrp="1" noRot="1" noChangeAspect="1" noMove="1" noResize="1" noEditPoints="1" noAdjustHandles="1" noChangeArrowheads="1" noChangeShapeType="1" noTextEdit="1"/>
+          </p:cNvSpPr>
+          <p:nvPr>
+            <p:extLst>
+              <p:ext uri="{386F3935-93C4-4BCD-93E2-E3B085C9AB24}">
+                <p16:designElem xmlns:p16="http://schemas.microsoft.com/office/powerpoint/2015/main" val="1"/>
+              </p:ext>
+            </p:extLst>
+          </p:nvPr>
+        </p:nvSpPr>
+        <p:spPr>
+          <a:xfrm>
+            <a:off x="0" y="0"/>
+            <a:ext cx="12192000" cy="6858000"/>
+          </a:xfrm>
+          <a:prstGeom prst="rect">
+            <a:avLst/>
+          </a:prstGeom>
+          <a:ln>
+            <a:noFill/>
+          </a:ln>
+        </p:spPr>
+        <p:style>
+          <a:lnRef idx="2">
+            <a:schemeClr val="accent1">
+              <a:shade val="50000"/>
+            </a:schemeClr>
+          </a:lnRef>
+          <a:fillRef idx="1">
+            <a:schemeClr val="accent1"/>
+          </a:fillRef>
+          <a:effectRef idx="0">
+            <a:schemeClr val="accent1"/>
+          </a:effectRef>
+          <a:fontRef idx="minor">
+            <a:schemeClr val="lt1"/>
+          </a:fontRef>
+        </p:style>
+        <p:txBody>
+          <a:bodyPr rtlCol="0" anchor="ctr"/>
+          <a:lstStyle/>
+          <a:p>
+            <a:pPr marL="0" marR="0" lvl="0" indent="0" algn="ctr" defTabSz="457200" rtl="0" eaLnBrk="1" fontAlgn="auto" latinLnBrk="0" hangingPunct="1">
+              <a:lnSpc>
+                <a:spcPct val="100000"/>
+              </a:lnSpc>
+              <a:spcBef>
+                <a:spcPts val="0"/>
+              </a:spcBef>
+              <a:spcAft>
+                <a:spcPts val="0"/>
+              </a:spcAft>
+              <a:buClrTx/>
+              <a:buSzTx/>
+              <a:buFontTx/>
+              <a:buNone/>
+              <a:tabLst/>
+              <a:defRPr/>
+            </a:pPr>
+            <a:endParaRPr kumimoji="0" lang="en-US" sz="1800" b="0" i="0" u="none" strike="noStrike" kern="1200" cap="none" spc="0" normalizeH="0" baseline="0" noProof="0">
+              <a:ln>
+                <a:noFill/>
+              </a:ln>
+              <a:solidFill>
+                <a:prstClr val="white"/>
+              </a:solidFill>
+              <a:effectLst/>
+              <a:uLnTx/>
+              <a:uFillTx/>
+              <a:latin typeface="Corbel" panose="020B0503020204020204"/>
+              <a:ea typeface="+mn-ea"/>
+              <a:cs typeface="+mn-cs"/>
+            </a:endParaRPr>
+          </a:p>
+        </p:txBody>
+      </p:sp>
+      <p:sp>
+        <p:nvSpPr>
+          <p:cNvPr id="11" name="Rectangle 10">
+            <a:extLst>
+              <a:ext uri="{FF2B5EF4-FFF2-40B4-BE49-F238E27FC236}">
+                <a16:creationId xmlns:a16="http://schemas.microsoft.com/office/drawing/2014/main" id="{0D614406-135F-4875-9C87-53822CB19ABB}"/>
+              </a:ext>
+              <a:ext uri="{C183D7F6-B498-43B3-948B-1728B52AA6E4}">
+                <adec:decorative xmlns:adec="http://schemas.microsoft.com/office/drawing/2017/decorative" val="1"/>
+              </a:ext>
+            </a:extLst>
+          </p:cNvPr>
+          <p:cNvSpPr>
+            <a:spLocks noGrp="1" noRot="1" noChangeAspect="1" noMove="1" noResize="1" noEditPoints="1" noAdjustHandles="1" noChangeArrowheads="1" noChangeShapeType="1" noTextEdit="1"/>
+          </p:cNvSpPr>
+          <p:nvPr>
+            <p:extLst>
+              <p:ext uri="{386F3935-93C4-4BCD-93E2-E3B085C9AB24}">
+                <p16:designElem xmlns:p16="http://schemas.microsoft.com/office/powerpoint/2015/main" val="1"/>
+              </p:ext>
+            </p:extLst>
+          </p:nvPr>
+        </p:nvSpPr>
+        <p:spPr>
+          <a:xfrm>
+            <a:off x="0" y="0"/>
+            <a:ext cx="12191999" cy="2285999"/>
+          </a:xfrm>
+          <a:prstGeom prst="rect">
+            <a:avLst/>
+          </a:prstGeom>
+          <a:solidFill>
+            <a:schemeClr val="tx1"/>
+          </a:solidFill>
+          <a:ln>
+            <a:noFill/>
+          </a:ln>
+        </p:spPr>
+        <p:style>
+          <a:lnRef idx="2">
+            <a:schemeClr val="accent1">
+              <a:shade val="50000"/>
+            </a:schemeClr>
+          </a:lnRef>
+          <a:fillRef idx="1">
+            <a:schemeClr val="accent1"/>
+          </a:fillRef>
+          <a:effectRef idx="0">
+            <a:schemeClr val="accent1"/>
+          </a:effectRef>
+          <a:fontRef idx="minor">
+            <a:schemeClr val="lt1"/>
+          </a:fontRef>
+        </p:style>
+        <p:txBody>
+          <a:bodyPr rtlCol="0" anchor="ctr"/>
+          <a:lstStyle/>
+          <a:p>
+            <a:pPr marL="0" marR="0" lvl="0" indent="0" algn="ctr" defTabSz="457200" rtl="0" eaLnBrk="1" fontAlgn="auto" latinLnBrk="0" hangingPunct="1">
+              <a:lnSpc>
+                <a:spcPct val="100000"/>
+              </a:lnSpc>
+              <a:spcBef>
+                <a:spcPts val="0"/>
+              </a:spcBef>
+              <a:spcAft>
+                <a:spcPts val="0"/>
+              </a:spcAft>
+              <a:buClrTx/>
+              <a:buSzTx/>
+              <a:buFontTx/>
+              <a:buNone/>
+              <a:tabLst/>
+              <a:defRPr/>
+            </a:pPr>
+            <a:endParaRPr kumimoji="0" lang="en-US" sz="1800" b="0" i="0" u="none" strike="noStrike" kern="1200" cap="none" spc="0" normalizeH="0" baseline="0" noProof="0">
+              <a:ln>
+                <a:noFill/>
+              </a:ln>
+              <a:solidFill>
+                <a:prstClr val="white"/>
+              </a:solidFill>
+              <a:effectLst/>
+              <a:uLnTx/>
+              <a:uFillTx/>
+              <a:latin typeface="Corbel" panose="020B0503020204020204"/>
+              <a:ea typeface="+mn-ea"/>
+              <a:cs typeface="+mn-cs"/>
+            </a:endParaRPr>
+          </a:p>
+        </p:txBody>
+      </p:sp>
+      <p:sp>
+        <p:nvSpPr>
+          <p:cNvPr id="2" name="Title 1"/>
+          <p:cNvSpPr>
+            <a:spLocks noGrp="1"/>
+          </p:cNvSpPr>
+          <p:nvPr>
+            <p:ph type="title"/>
+          </p:nvPr>
+        </p:nvSpPr>
+        <p:spPr>
+          <a:xfrm>
+            <a:off x="155421" y="-293716"/>
+            <a:ext cx="7169753" cy="1232750"/>
+          </a:xfrm>
+        </p:spPr>
+        <p:txBody>
+          <a:bodyPr anchor="b">
+            <a:normAutofit/>
+          </a:bodyPr>
+          <a:lstStyle/>
+          <a:p>
+            <a:pPr algn="l"/>
+            <a:r>
+              <a:rPr lang="en-US" dirty="0">
+                <a:solidFill>
+                  <a:schemeClr val="bg1"/>
+                </a:solidFill>
+              </a:rPr>
+              <a:t>Enjoy Your Flight</a:t>
+            </a:r>
+          </a:p>
+        </p:txBody>
+      </p:sp>
+      <p:cxnSp>
+        <p:nvCxnSpPr>
+          <p:cNvPr id="13" name="Straight Connector 12">
+            <a:extLst>
+              <a:ext uri="{FF2B5EF4-FFF2-40B4-BE49-F238E27FC236}">
+                <a16:creationId xmlns:a16="http://schemas.microsoft.com/office/drawing/2014/main" id="{C6C21149-7D17-44C2-AFB6-4D931DC55FB1}"/>
+              </a:ext>
+              <a:ext uri="{C183D7F6-B498-43B3-948B-1728B52AA6E4}">
+                <adec:decorative xmlns:adec="http://schemas.microsoft.com/office/drawing/2017/decorative" val="1"/>
+              </a:ext>
+            </a:extLst>
+          </p:cNvPr>
+          <p:cNvCxnSpPr>
+            <a:cxnSpLocks noGrp="1" noRot="1" noChangeAspect="1" noMove="1" noResize="1" noEditPoints="1" noAdjustHandles="1" noChangeArrowheads="1" noChangeShapeType="1"/>
+          </p:cNvCxnSpPr>
+          <p:nvPr>
+            <p:extLst>
+              <p:ext uri="{386F3935-93C4-4BCD-93E2-E3B085C9AB24}">
+                <p16:designElem xmlns:p16="http://schemas.microsoft.com/office/powerpoint/2015/main" val="1"/>
+              </p:ext>
+            </p:extLst>
+          </p:nvPr>
+        </p:nvCxnSpPr>
+        <p:spPr>
+          <a:xfrm>
+            <a:off x="0" y="1676579"/>
+            <a:ext cx="8129873" cy="6020"/>
+          </a:xfrm>
+          <a:prstGeom prst="line">
+            <a:avLst/>
+          </a:prstGeom>
+          <a:ln w="25400">
+            <a:solidFill>
+              <a:schemeClr val="bg1"/>
+            </a:solidFill>
+          </a:ln>
+        </p:spPr>
+        <p:style>
+          <a:lnRef idx="1">
+            <a:schemeClr val="accent1"/>
+          </a:lnRef>
+          <a:fillRef idx="0">
+            <a:schemeClr val="accent1"/>
+          </a:fillRef>
+          <a:effectRef idx="0">
+            <a:schemeClr val="accent1"/>
+          </a:effectRef>
+          <a:fontRef idx="minor">
+            <a:schemeClr val="tx1"/>
+          </a:fontRef>
+        </p:style>
+      </p:cxnSp>
+      <p:sp>
+        <p:nvSpPr>
+          <p:cNvPr id="15" name="Freeform 6">
+            <a:extLst>
+              <a:ext uri="{FF2B5EF4-FFF2-40B4-BE49-F238E27FC236}">
+                <a16:creationId xmlns:a16="http://schemas.microsoft.com/office/drawing/2014/main" id="{C2E5FCF0-567A-448C-A6E3-920BFC702C2F}"/>
+              </a:ext>
+              <a:ext uri="{C183D7F6-B498-43B3-948B-1728B52AA6E4}">
+                <adec:decorative xmlns:adec="http://schemas.microsoft.com/office/drawing/2017/decorative" val="1"/>
+              </a:ext>
+            </a:extLst>
+          </p:cNvPr>
+          <p:cNvSpPr>
+            <a:spLocks noGrp="1" noRot="1" noChangeAspect="1" noMove="1" noResize="1" noEditPoints="1" noAdjustHandles="1" noChangeArrowheads="1" noChangeShapeType="1" noTextEdit="1"/>
+          </p:cNvSpPr>
+          <p:nvPr>
+            <p:extLst>
+              <p:ext uri="{386F3935-93C4-4BCD-93E2-E3B085C9AB24}">
+                <p16:designElem xmlns:p16="http://schemas.microsoft.com/office/powerpoint/2015/main" val="1"/>
+              </p:ext>
+            </p:extLst>
+          </p:nvPr>
+        </p:nvSpPr>
+        <p:spPr bwMode="auto">
+          <a:xfrm>
+            <a:off x="11784011" y="938535"/>
+            <a:ext cx="407988" cy="819150"/>
+          </a:xfrm>
+          <a:custGeom>
+            <a:avLst/>
+            <a:gdLst/>
+            <a:ahLst/>
+            <a:cxnLst/>
+            <a:rect l="0" t="0" r="r" b="b"/>
+            <a:pathLst>
+              <a:path w="1799" h="3612">
+                <a:moveTo>
+                  <a:pt x="1799" y="0"/>
+                </a:moveTo>
+                <a:lnTo>
+                  <a:pt x="1799" y="3612"/>
+                </a:lnTo>
+                <a:lnTo>
+                  <a:pt x="1686" y="3609"/>
+                </a:lnTo>
+                <a:lnTo>
+                  <a:pt x="1574" y="3598"/>
+                </a:lnTo>
+                <a:lnTo>
+                  <a:pt x="1464" y="3581"/>
+                </a:lnTo>
+                <a:lnTo>
+                  <a:pt x="1357" y="3557"/>
+                </a:lnTo>
+                <a:lnTo>
+                  <a:pt x="1251" y="3527"/>
+                </a:lnTo>
+                <a:lnTo>
+                  <a:pt x="1150" y="3490"/>
+                </a:lnTo>
+                <a:lnTo>
+                  <a:pt x="1050" y="3448"/>
+                </a:lnTo>
+                <a:lnTo>
+                  <a:pt x="953" y="3401"/>
+                </a:lnTo>
+                <a:lnTo>
+                  <a:pt x="860" y="3347"/>
+                </a:lnTo>
+                <a:lnTo>
+                  <a:pt x="771" y="3289"/>
+                </a:lnTo>
+                <a:lnTo>
+                  <a:pt x="686" y="3224"/>
+                </a:lnTo>
+                <a:lnTo>
+                  <a:pt x="604" y="3156"/>
+                </a:lnTo>
+                <a:lnTo>
+                  <a:pt x="527" y="3083"/>
+                </a:lnTo>
+                <a:lnTo>
+                  <a:pt x="454" y="3005"/>
+                </a:lnTo>
+                <a:lnTo>
+                  <a:pt x="386" y="2923"/>
+                </a:lnTo>
+                <a:lnTo>
+                  <a:pt x="323" y="2838"/>
+                </a:lnTo>
+                <a:lnTo>
+                  <a:pt x="265" y="2748"/>
+                </a:lnTo>
+                <a:lnTo>
+                  <a:pt x="211" y="2655"/>
+                </a:lnTo>
+                <a:lnTo>
+                  <a:pt x="163" y="2559"/>
+                </a:lnTo>
+                <a:lnTo>
+                  <a:pt x="121" y="2459"/>
+                </a:lnTo>
+                <a:lnTo>
+                  <a:pt x="85" y="2356"/>
+                </a:lnTo>
+                <a:lnTo>
+                  <a:pt x="55" y="2251"/>
+                </a:lnTo>
+                <a:lnTo>
+                  <a:pt x="32" y="2143"/>
+                </a:lnTo>
+                <a:lnTo>
+                  <a:pt x="14" y="2033"/>
+                </a:lnTo>
+                <a:lnTo>
+                  <a:pt x="4" y="1920"/>
+                </a:lnTo>
+                <a:lnTo>
+                  <a:pt x="0" y="1806"/>
+                </a:lnTo>
+                <a:lnTo>
+                  <a:pt x="4" y="1692"/>
+                </a:lnTo>
+                <a:lnTo>
+                  <a:pt x="14" y="1580"/>
+                </a:lnTo>
+                <a:lnTo>
+                  <a:pt x="32" y="1469"/>
+                </a:lnTo>
+                <a:lnTo>
+                  <a:pt x="55" y="1362"/>
+                </a:lnTo>
+                <a:lnTo>
+                  <a:pt x="85" y="1256"/>
+                </a:lnTo>
+                <a:lnTo>
+                  <a:pt x="121" y="1154"/>
+                </a:lnTo>
+                <a:lnTo>
+                  <a:pt x="163" y="1054"/>
+                </a:lnTo>
+                <a:lnTo>
+                  <a:pt x="211" y="958"/>
+                </a:lnTo>
+                <a:lnTo>
+                  <a:pt x="265" y="864"/>
+                </a:lnTo>
+                <a:lnTo>
+                  <a:pt x="323" y="774"/>
+                </a:lnTo>
+                <a:lnTo>
+                  <a:pt x="386" y="689"/>
+                </a:lnTo>
+                <a:lnTo>
+                  <a:pt x="454" y="607"/>
+                </a:lnTo>
+                <a:lnTo>
+                  <a:pt x="527" y="529"/>
+                </a:lnTo>
+                <a:lnTo>
+                  <a:pt x="604" y="456"/>
+                </a:lnTo>
+                <a:lnTo>
+                  <a:pt x="686" y="388"/>
+                </a:lnTo>
+                <a:lnTo>
+                  <a:pt x="771" y="325"/>
+                </a:lnTo>
+                <a:lnTo>
+                  <a:pt x="860" y="266"/>
+                </a:lnTo>
+                <a:lnTo>
+                  <a:pt x="953" y="212"/>
+                </a:lnTo>
+                <a:lnTo>
+                  <a:pt x="1050" y="164"/>
+                </a:lnTo>
+                <a:lnTo>
+                  <a:pt x="1150" y="122"/>
+                </a:lnTo>
+                <a:lnTo>
+                  <a:pt x="1251" y="85"/>
+                </a:lnTo>
+                <a:lnTo>
+                  <a:pt x="1357" y="55"/>
+                </a:lnTo>
+                <a:lnTo>
+                  <a:pt x="1464" y="32"/>
+                </a:lnTo>
+                <a:lnTo>
+                  <a:pt x="1574" y="14"/>
+                </a:lnTo>
+                <a:lnTo>
+                  <a:pt x="1686" y="5"/>
+                </a:lnTo>
+                <a:lnTo>
+                  <a:pt x="1799" y="0"/>
+                </a:lnTo>
+                <a:close/>
+              </a:path>
+            </a:pathLst>
+          </a:custGeom>
+          <a:solidFill>
+            <a:schemeClr val="bg2"/>
+          </a:solidFill>
+          <a:ln w="0">
+            <a:noFill/>
+            <a:prstDash val="solid"/>
+            <a:round/>
+            <a:headEnd/>
+            <a:tailEnd/>
+          </a:ln>
+        </p:spPr>
+      </p:sp>
+      <p:pic>
+        <p:nvPicPr>
+          <p:cNvPr id="8" name="Picture 7">
+            <a:extLst>
+              <a:ext uri="{FF2B5EF4-FFF2-40B4-BE49-F238E27FC236}">
+                <a16:creationId xmlns:a16="http://schemas.microsoft.com/office/drawing/2014/main" id="{4DAE8170-F041-4204-BF25-1FE1942D1FA4}"/>
+              </a:ext>
+            </a:extLst>
+          </p:cNvPr>
+          <p:cNvPicPr>
+            <a:picLocks noChangeAspect="1"/>
+          </p:cNvPicPr>
+          <p:nvPr/>
+        </p:nvPicPr>
+        <p:blipFill>
+          <a:blip r:embed="rId2"/>
+          <a:stretch>
+            <a:fillRect/>
+          </a:stretch>
+        </p:blipFill>
+        <p:spPr>
+          <a:xfrm>
+            <a:off x="-1" y="898246"/>
+            <a:ext cx="12192000" cy="6014720"/>
+          </a:xfrm>
+          <a:prstGeom prst="rect">
+            <a:avLst/>
+          </a:prstGeom>
+        </p:spPr>
+      </p:pic>
+    </p:spTree>
+    <p:extLst>
+      <p:ext uri="{BB962C8B-B14F-4D97-AF65-F5344CB8AC3E}">
+        <p14:creationId xmlns:p14="http://schemas.microsoft.com/office/powerpoint/2010/main" val="1936390644"/>
       </p:ext>
     </p:extLst>
   </p:cSld>

</xml_diff>